<commit_message>
Updated readme and readded pptx
</commit_message>
<xml_diff>
--- a/presentation.pptx
+++ b/presentation.pptx
@@ -108,7 +108,16 @@
       </a:defRPr>
     </a:lvl9pPr>
   </p:defaultTextStyle>
+  <p:extLst>
+    <p:ext uri="{EFAFB233-063F-42B5-8137-9DF3F51BA10A}">
+      <p15:sldGuideLst xmlns:p15="http://schemas.microsoft.com/office/powerpoint/2012/main"/>
+    </p:ext>
+  </p:extLst>
 </p:presentation>
+</file>
+
+<file path=ppt/revisionInfo.xml><?xml version="1.0" encoding="utf-8"?>
+<p1510:revInfo xmlns:a="http://schemas.openxmlformats.org/drawingml/2006/main" xmlns:r="http://schemas.openxmlformats.org/officeDocument/2006/relationships" xmlns:p1510="http://schemas.microsoft.com/office/powerpoint/2015/10/main"/>
 </file>
 
 <file path=ppt/slideLayouts/slideLayout1.xml><?xml version="1.0" encoding="utf-8"?>
@@ -6922,7 +6931,7 @@
           <a:p>
             <a:r>
               <a:rPr lang="en-US" dirty="0"/>
-              <a:t>API</a:t>
+              <a:t>API Endpoints</a:t>
             </a:r>
           </a:p>
         </p:txBody>

</xml_diff>